<commit_message>
Added Pages2 complementary to Pages, pdf of an article used and a more complete version of presentation
</commit_message>
<xml_diff>
--- a/Защита прав публикатора.pptx
+++ b/Защита прав публикатора.pptx
@@ -7,7 +7,13 @@
   <p:sldIdLst>
     <p:sldId id="256" r:id="rId2"/>
     <p:sldId id="257" r:id="rId3"/>
-    <p:sldId id="258" r:id="rId4"/>
+    <p:sldId id="263" r:id="rId4"/>
+    <p:sldId id="264" r:id="rId5"/>
+    <p:sldId id="265" r:id="rId6"/>
+    <p:sldId id="261" r:id="rId7"/>
+    <p:sldId id="262" r:id="rId8"/>
+    <p:sldId id="259" r:id="rId9"/>
+    <p:sldId id="260" r:id="rId10"/>
   </p:sldIdLst>
   <p:sldSz cx="9144000" cy="6858000" type="screen4x3"/>
   <p:notesSz cx="6858000" cy="9144000"/>
@@ -768,7 +774,7 @@
             <a:fld id="{5B106E36-FD25-4E2D-B0AA-010F637433A0}" type="datetimeFigureOut">
               <a:rPr lang="ru-RU" smtClean="0"/>
               <a:pPr/>
-              <a:t>16.05.2018</a:t>
+              <a:t>18.05.2018</a:t>
             </a:fld>
             <a:endParaRPr lang="ru-RU"/>
           </a:p>
@@ -953,7 +959,7 @@
             <a:fld id="{5B106E36-FD25-4E2D-B0AA-010F637433A0}" type="datetimeFigureOut">
               <a:rPr lang="ru-RU" smtClean="0"/>
               <a:pPr/>
-              <a:t>16.05.2018</a:t>
+              <a:t>18.05.2018</a:t>
             </a:fld>
             <a:endParaRPr lang="ru-RU"/>
           </a:p>
@@ -1130,7 +1136,7 @@
             <a:fld id="{5B106E36-FD25-4E2D-B0AA-010F637433A0}" type="datetimeFigureOut">
               <a:rPr lang="ru-RU" smtClean="0"/>
               <a:pPr/>
-              <a:t>16.05.2018</a:t>
+              <a:t>18.05.2018</a:t>
             </a:fld>
             <a:endParaRPr lang="ru-RU"/>
           </a:p>
@@ -1297,7 +1303,7 @@
             <a:fld id="{5B106E36-FD25-4E2D-B0AA-010F637433A0}" type="datetimeFigureOut">
               <a:rPr lang="ru-RU" smtClean="0"/>
               <a:pPr/>
-              <a:t>16.05.2018</a:t>
+              <a:t>18.05.2018</a:t>
             </a:fld>
             <a:endParaRPr lang="ru-RU"/>
           </a:p>
@@ -1520,7 +1526,7 @@
             <a:fld id="{5B106E36-FD25-4E2D-B0AA-010F637433A0}" type="datetimeFigureOut">
               <a:rPr lang="ru-RU" smtClean="0"/>
               <a:pPr/>
-              <a:t>16.05.2018</a:t>
+              <a:t>18.05.2018</a:t>
             </a:fld>
             <a:endParaRPr lang="ru-RU"/>
           </a:p>
@@ -1781,7 +1787,7 @@
             <a:fld id="{5B106E36-FD25-4E2D-B0AA-010F637433A0}" type="datetimeFigureOut">
               <a:rPr lang="ru-RU" smtClean="0"/>
               <a:pPr/>
-              <a:t>16.05.2018</a:t>
+              <a:t>18.05.2018</a:t>
             </a:fld>
             <a:endParaRPr lang="ru-RU"/>
           </a:p>
@@ -2187,7 +2193,7 @@
             <a:fld id="{5B106E36-FD25-4E2D-B0AA-010F637433A0}" type="datetimeFigureOut">
               <a:rPr lang="ru-RU" smtClean="0"/>
               <a:pPr/>
-              <a:t>16.05.2018</a:t>
+              <a:t>18.05.2018</a:t>
             </a:fld>
             <a:endParaRPr lang="ru-RU"/>
           </a:p>
@@ -2320,7 +2326,7 @@
             <a:fld id="{5B106E36-FD25-4E2D-B0AA-010F637433A0}" type="datetimeFigureOut">
               <a:rPr lang="ru-RU" smtClean="0"/>
               <a:pPr/>
-              <a:t>16.05.2018</a:t>
+              <a:t>18.05.2018</a:t>
             </a:fld>
             <a:endParaRPr lang="ru-RU"/>
           </a:p>
@@ -2422,7 +2428,7 @@
             <a:fld id="{5B106E36-FD25-4E2D-B0AA-010F637433A0}" type="datetimeFigureOut">
               <a:rPr lang="ru-RU" smtClean="0"/>
               <a:pPr/>
-              <a:t>16.05.2018</a:t>
+              <a:t>18.05.2018</a:t>
             </a:fld>
             <a:endParaRPr lang="ru-RU"/>
           </a:p>
@@ -2669,7 +2675,7 @@
             <a:fld id="{5B106E36-FD25-4E2D-B0AA-010F637433A0}" type="datetimeFigureOut">
               <a:rPr lang="ru-RU" smtClean="0"/>
               <a:pPr/>
-              <a:t>16.05.2018</a:t>
+              <a:t>18.05.2018</a:t>
             </a:fld>
             <a:endParaRPr lang="ru-RU"/>
           </a:p>
@@ -2915,7 +2921,7 @@
             <a:fld id="{5B106E36-FD25-4E2D-B0AA-010F637433A0}" type="datetimeFigureOut">
               <a:rPr lang="ru-RU" smtClean="0"/>
               <a:pPr/>
-              <a:t>16.05.2018</a:t>
+              <a:t>18.05.2018</a:t>
             </a:fld>
             <a:endParaRPr lang="ru-RU"/>
           </a:p>
@@ -3741,7 +3747,7 @@
             <a:fld id="{5B106E36-FD25-4E2D-B0AA-010F637433A0}" type="datetimeFigureOut">
               <a:rPr lang="ru-RU" smtClean="0"/>
               <a:pPr/>
-              <a:t>16.05.2018</a:t>
+              <a:t>18.05.2018</a:t>
             </a:fld>
             <a:endParaRPr lang="ru-RU"/>
           </a:p>
@@ -4178,11 +4184,22 @@
             <a:pPr algn="r"/>
             <a:r>
               <a:rPr lang="ru-RU" dirty="0" smtClean="0"/>
-              <a:t>п</a:t>
-            </a:r>
+              <a:t>Подготовил</a:t>
+            </a:r>
+          </a:p>
+          <a:p>
+            <a:pPr algn="r"/>
             <a:r>
               <a:rPr lang="ru-RU" dirty="0" smtClean="0"/>
-              <a:t>одготовил студент 3его курса</a:t>
+              <a:t>с</a:t>
+            </a:r>
+            <a:r>
+              <a:rPr lang="ru-RU" dirty="0" smtClean="0"/>
+              <a:t>тудент </a:t>
+            </a:r>
+            <a:r>
+              <a:rPr lang="ru-RU" dirty="0" smtClean="0"/>
+              <a:t>3его курса</a:t>
             </a:r>
           </a:p>
           <a:p>
@@ -4244,7 +4261,7 @@
           <a:p>
             <a:r>
               <a:rPr lang="ru-RU" dirty="0" smtClean="0"/>
-              <a:t>Обозначим</a:t>
+              <a:t>Повторим и закрепим</a:t>
             </a:r>
             <a:endParaRPr lang="ru-RU" dirty="0"/>
           </a:p>
@@ -4260,62 +4277,99 @@
             <p:ph idx="1"/>
           </p:nvPr>
         </p:nvSpPr>
-        <p:spPr/>
+        <p:spPr>
+          <a:xfrm>
+            <a:off x="428596" y="2071678"/>
+            <a:ext cx="8229600" cy="4325112"/>
+          </a:xfrm>
+        </p:spPr>
         <p:txBody>
           <a:bodyPr>
-            <a:normAutofit fontScale="70000" lnSpcReduction="20000"/>
+            <a:noAutofit/>
           </a:bodyPr>
           <a:lstStyle/>
           <a:p>
             <a:r>
-              <a:rPr lang="ru-RU" dirty="0" smtClean="0"/>
-              <a:t>Статья 1337 ГК РФ:</a:t>
-            </a:r>
-          </a:p>
-          <a:p>
-            <a:r>
-              <a:rPr lang="ru-RU" dirty="0" smtClean="0"/>
+              <a:rPr lang="ru-RU" sz="1600" dirty="0" smtClean="0"/>
+              <a:t>Статья 1341 ГК РФ:</a:t>
+            </a:r>
+          </a:p>
+          <a:p>
+            <a:r>
+              <a:rPr lang="ru-RU" sz="1600" dirty="0" smtClean="0"/>
               <a:t>1</a:t>
             </a:r>
             <a:r>
-              <a:rPr lang="ru-RU" dirty="0" smtClean="0"/>
-              <a:t>. Публикатором признается гражданин, который правомерно обнародовал или организовал обнародование произведения науки, литературы или искусства, ранее не обнародованного и перешедшего в общественное достояние (статья 1282) либо находящегося в общественном достоянии в силу того, что оно не охранялось авторским </a:t>
-            </a:r>
-            <a:r>
-              <a:rPr lang="ru-RU" dirty="0" smtClean="0"/>
-              <a:t>правом.</a:t>
-            </a:r>
-          </a:p>
-          <a:p>
-            <a:endParaRPr lang="ru-RU" dirty="0" smtClean="0"/>
-          </a:p>
-          <a:p>
-            <a:r>
-              <a:rPr lang="ru-RU" dirty="0" smtClean="0"/>
+              <a:rPr lang="ru-RU" sz="1600" dirty="0" smtClean="0"/>
+              <a:t>. Исключительное право публикатора распространяется на </a:t>
+            </a:r>
+            <a:r>
+              <a:rPr lang="ru-RU" sz="1600" dirty="0" smtClean="0"/>
+              <a:t>произведение:</a:t>
+            </a:r>
+            <a:br>
+              <a:rPr lang="ru-RU" sz="1600" dirty="0" smtClean="0"/>
+            </a:br>
+            <a:r>
+              <a:rPr lang="ru-RU" sz="1600" dirty="0" smtClean="0"/>
+              <a:t>1</a:t>
+            </a:r>
+            <a:r>
+              <a:rPr lang="ru-RU" sz="1600" dirty="0" smtClean="0"/>
+              <a:t>) обнародованное на территории Российской Федерации, независимо от гражданства </a:t>
+            </a:r>
+            <a:r>
+              <a:rPr lang="ru-RU" sz="1600" dirty="0" smtClean="0"/>
+              <a:t>публикатора;</a:t>
+            </a:r>
+            <a:br>
+              <a:rPr lang="ru-RU" sz="1600" dirty="0" smtClean="0"/>
+            </a:br>
+            <a:r>
+              <a:rPr lang="ru-RU" sz="1600" dirty="0" smtClean="0"/>
               <a:t>2</a:t>
             </a:r>
             <a:r>
-              <a:rPr lang="ru-RU" dirty="0" smtClean="0"/>
-              <a:t>. Права публикатора распространяются на произведения, которые независимо от времени их создания могли быть признаны объектами авторского права в соответствии с правилами статьи 1259 настоящего </a:t>
-            </a:r>
-            <a:r>
-              <a:rPr lang="ru-RU" dirty="0" smtClean="0"/>
-              <a:t>Кодекса.</a:t>
-            </a:r>
-          </a:p>
-          <a:p>
-            <a:endParaRPr lang="ru-RU" dirty="0" smtClean="0"/>
-          </a:p>
-          <a:p>
-            <a:r>
-              <a:rPr lang="ru-RU" dirty="0" smtClean="0"/>
+              <a:rPr lang="ru-RU" sz="1600" dirty="0" smtClean="0"/>
+              <a:t>) обнародованное за пределами территории Российской Федерации гражданином Российской </a:t>
+            </a:r>
+            <a:r>
+              <a:rPr lang="ru-RU" sz="1600" dirty="0" smtClean="0"/>
+              <a:t>Федерации;</a:t>
+            </a:r>
+            <a:br>
+              <a:rPr lang="ru-RU" sz="1600" dirty="0" smtClean="0"/>
+            </a:br>
+            <a:r>
+              <a:rPr lang="ru-RU" sz="1600" dirty="0" smtClean="0"/>
               <a:t>3</a:t>
             </a:r>
             <a:r>
-              <a:rPr lang="ru-RU" dirty="0" smtClean="0"/>
-              <a:t>. Положения, предусмотренные настоящим параграфом, не распространяются на произведения, находящиеся в государственных и муниципальных архивах.</a:t>
-            </a:r>
-            <a:endParaRPr lang="ru-RU" dirty="0"/>
+              <a:rPr lang="ru-RU" sz="1600" dirty="0" smtClean="0"/>
+              <a:t>) обнародованное за пределами территории Российской Федерации иностранным гражданином или лицом без гражданства, при условии, что законодательством иностранного государства, в котором обнародовано произведение, предоставляется на его территории охрана исключительному праву публикатора, являющегося гражданином Российской </a:t>
+            </a:r>
+            <a:r>
+              <a:rPr lang="ru-RU" sz="1600" dirty="0" smtClean="0"/>
+              <a:t>Федерации;</a:t>
+            </a:r>
+            <a:br>
+              <a:rPr lang="ru-RU" sz="1600" dirty="0" smtClean="0"/>
+            </a:br>
+            <a:r>
+              <a:rPr lang="ru-RU" sz="1600" dirty="0" smtClean="0"/>
+              <a:t>4</a:t>
+            </a:r>
+            <a:r>
+              <a:rPr lang="ru-RU" sz="1600" dirty="0" smtClean="0"/>
+              <a:t>) в иных случаях, предусмотренных международными договорами Российской Федерации.</a:t>
+            </a:r>
+          </a:p>
+          <a:p>
+            <a:r>
+              <a:rPr lang="ru-RU" sz="1600" dirty="0" smtClean="0"/>
+              <a:t>2. В случае, указанном в подпункте 3 пункта 1 настоящей статьи, срок действия исключительного права публикатора на произведение на территории Российской Федерации не может превышать срок действия исключительного права публикатора на произведение, установленный в государстве, на территории которого имел место юридический факт, послуживший основанием для приобретения такого исключительного права.</a:t>
+            </a:r>
+            <a:endParaRPr lang="ru-RU" sz="1600" dirty="0"/>
           </a:p>
         </p:txBody>
       </p:sp>
@@ -4359,14 +4413,89 @@
           <a:bodyPr/>
           <a:lstStyle/>
           <a:p>
+            <a:endParaRPr lang="ru-RU"/>
+          </a:p>
+        </p:txBody>
+      </p:sp>
+      <p:sp>
+        <p:nvSpPr>
+          <p:cNvPr id="3" name="Содержимое 2"/>
+          <p:cNvSpPr>
+            <a:spLocks noGrp="1"/>
+          </p:cNvSpPr>
+          <p:nvPr>
+            <p:ph idx="1"/>
+          </p:nvPr>
+        </p:nvSpPr>
+        <p:spPr/>
+        <p:txBody>
+          <a:bodyPr>
+            <a:normAutofit lnSpcReduction="10000"/>
+          </a:bodyPr>
+          <a:lstStyle/>
+          <a:p>
             <a:r>
               <a:rPr lang="ru-RU" dirty="0" smtClean="0"/>
-              <a:t>Разберёмся</a:t>
+              <a:t>Статья 1342 ГК РФ:</a:t>
+            </a:r>
+          </a:p>
+          <a:p>
+            <a:r>
+              <a:rPr lang="ru-RU" dirty="0" smtClean="0"/>
+              <a:t>Исключительное </a:t>
+            </a:r>
+            <a:r>
+              <a:rPr lang="ru-RU" dirty="0" smtClean="0"/>
+              <a:t>право публикатора на произведение может быть прекращено досрочно в судебном порядке по иску заинтересованного лица, если при использовании произведения правообладатель нарушает требования настоящего Кодекса в отношении охраны авторства, имени автора или неприкосновенности произведения.</a:t>
             </a:r>
             <a:endParaRPr lang="ru-RU" dirty="0"/>
           </a:p>
         </p:txBody>
       </p:sp>
+    </p:spTree>
+  </p:cSld>
+  <p:clrMapOvr>
+    <a:masterClrMapping/>
+  </p:clrMapOvr>
+</p:sld>
+</file>
+
+<file path=ppt/slides/slide4.xml><?xml version="1.0" encoding="utf-8"?>
+<p:sld xmlns:a="http://schemas.openxmlformats.org/drawingml/2006/main" xmlns:r="http://schemas.openxmlformats.org/officeDocument/2006/relationships" xmlns:p="http://schemas.openxmlformats.org/presentationml/2006/main">
+  <p:cSld>
+    <p:spTree>
+      <p:nvGrpSpPr>
+        <p:cNvPr id="1" name=""/>
+        <p:cNvGrpSpPr/>
+        <p:nvPr/>
+      </p:nvGrpSpPr>
+      <p:grpSpPr>
+        <a:xfrm>
+          <a:off x="0" y="0"/>
+          <a:ext cx="0" cy="0"/>
+          <a:chOff x="0" y="0"/>
+          <a:chExt cx="0" cy="0"/>
+        </a:xfrm>
+      </p:grpSpPr>
+      <p:sp>
+        <p:nvSpPr>
+          <p:cNvPr id="2" name="Заголовок 1"/>
+          <p:cNvSpPr>
+            <a:spLocks noGrp="1"/>
+          </p:cNvSpPr>
+          <p:nvPr>
+            <p:ph type="title"/>
+          </p:nvPr>
+        </p:nvSpPr>
+        <p:spPr/>
+        <p:txBody>
+          <a:bodyPr/>
+          <a:lstStyle/>
+          <a:p>
+            <a:endParaRPr lang="ru-RU"/>
+          </a:p>
+        </p:txBody>
+      </p:sp>
       <p:sp>
         <p:nvSpPr>
           <p:cNvPr id="3" name="Содержимое 2"/>
@@ -4380,89 +4509,810 @@
         <p:spPr/>
         <p:txBody>
           <a:bodyPr>
-            <a:normAutofit fontScale="62500" lnSpcReduction="20000"/>
+            <a:normAutofit fontScale="77500" lnSpcReduction="20000"/>
           </a:bodyPr>
           <a:lstStyle/>
           <a:p>
             <a:r>
               <a:rPr lang="ru-RU" dirty="0" smtClean="0"/>
-              <a:t>Статья 1338 ГК РФ:</a:t>
+              <a:t>Статья 1343 ГК РФ:</a:t>
             </a:r>
           </a:p>
           <a:p>
             <a:r>
               <a:rPr lang="ru-RU" dirty="0" smtClean="0"/>
-              <a:t>1. Публикатору </a:t>
-            </a:r>
+              <a:t>1. При отчуждении оригинала произведения (рукописи, оригинала произведения живописи, скульптуры или другого подобного произведения) его собственником, обладающим исключительным правом публикатора на отчуждаемое произведение, это исключительное право переходит к приобретателю оригинала произведения, если договором не предусмотрено иное.</a:t>
+            </a:r>
+          </a:p>
+          <a:p>
             <a:r>
               <a:rPr lang="ru-RU" dirty="0" smtClean="0"/>
-              <a:t>принадлежат:</a:t>
-            </a:r>
-            <a:br>
-              <a:rPr lang="ru-RU" dirty="0" smtClean="0"/>
-            </a:br>
-            <a:r>
-              <a:rPr lang="ru-RU" dirty="0" smtClean="0"/>
-              <a:t>1</a:t>
-            </a:r>
-            <a:r>
-              <a:rPr lang="ru-RU" dirty="0" smtClean="0"/>
-              <a:t>) исключительное право публикатора на обнародованное им произведение (пункт 1 статьи 1339</a:t>
-            </a:r>
-            <a:r>
-              <a:rPr lang="ru-RU" dirty="0" smtClean="0"/>
-              <a:t>);</a:t>
-            </a:r>
-            <a:br>
-              <a:rPr lang="ru-RU" dirty="0" smtClean="0"/>
-            </a:br>
-            <a:r>
-              <a:rPr lang="ru-RU" dirty="0" smtClean="0"/>
-              <a:t>2</a:t>
-            </a:r>
-            <a:r>
-              <a:rPr lang="ru-RU" dirty="0" smtClean="0"/>
-              <a:t>) право на указание своего имени на экземплярах обнародованного им произведения и в иных случаях его использования, в том числе при переводе или другой переработке произведения</a:t>
+              <a:t>2. Если исключительное право публикатора на произведение не перешло к приобретателю оригинала произведения, приобретатель вправе без согласия обладателя исключительного права публикатора использовать оригинал произведения способами, указанными в пункте 2 статьи 1291 настоящего Кодекса</a:t>
             </a:r>
             <a:r>
               <a:rPr lang="ru-RU" dirty="0" smtClean="0"/>
               <a:t>.</a:t>
             </a:r>
-          </a:p>
-          <a:p>
             <a:endParaRPr lang="ru-RU" dirty="0" smtClean="0"/>
           </a:p>
+        </p:txBody>
+      </p:sp>
+    </p:spTree>
+  </p:cSld>
+  <p:clrMapOvr>
+    <a:masterClrMapping/>
+  </p:clrMapOvr>
+</p:sld>
+</file>
+
+<file path=ppt/slides/slide5.xml><?xml version="1.0" encoding="utf-8"?>
+<p:sld xmlns:a="http://schemas.openxmlformats.org/drawingml/2006/main" xmlns:r="http://schemas.openxmlformats.org/officeDocument/2006/relationships" xmlns:p="http://schemas.openxmlformats.org/presentationml/2006/main">
+  <p:cSld>
+    <p:spTree>
+      <p:nvGrpSpPr>
+        <p:cNvPr id="1" name=""/>
+        <p:cNvGrpSpPr/>
+        <p:nvPr/>
+      </p:nvGrpSpPr>
+      <p:grpSpPr>
+        <a:xfrm>
+          <a:off x="0" y="0"/>
+          <a:ext cx="0" cy="0"/>
+          <a:chOff x="0" y="0"/>
+          <a:chExt cx="0" cy="0"/>
+        </a:xfrm>
+      </p:grpSpPr>
+      <p:sp>
+        <p:nvSpPr>
+          <p:cNvPr id="2" name="Заголовок 1"/>
+          <p:cNvSpPr>
+            <a:spLocks noGrp="1"/>
+          </p:cNvSpPr>
+          <p:nvPr>
+            <p:ph type="title"/>
+          </p:nvPr>
+        </p:nvSpPr>
+        <p:spPr/>
+        <p:txBody>
+          <a:bodyPr/>
+          <a:lstStyle/>
+          <a:p>
+            <a:endParaRPr lang="ru-RU"/>
+          </a:p>
+        </p:txBody>
+      </p:sp>
+      <p:sp>
+        <p:nvSpPr>
+          <p:cNvPr id="3" name="Содержимое 2"/>
+          <p:cNvSpPr>
+            <a:spLocks noGrp="1"/>
+          </p:cNvSpPr>
+          <p:nvPr>
+            <p:ph idx="1"/>
+          </p:nvPr>
+        </p:nvSpPr>
+        <p:spPr/>
+        <p:txBody>
+          <a:bodyPr>
+            <a:normAutofit lnSpcReduction="10000"/>
+          </a:bodyPr>
+          <a:lstStyle/>
           <a:p>
             <a:r>
               <a:rPr lang="ru-RU" dirty="0" smtClean="0"/>
-              <a:t>2. При обнародовании произведения публикатор обязан соблюдать условия, предусмотренные пунктом 3 статьи 1268 настоящего Кодекса</a:t>
-            </a:r>
+              <a:t>Статья 1344 ГК РФ:</a:t>
+            </a:r>
+          </a:p>
+          <a:p>
             <a:r>
               <a:rPr lang="ru-RU" dirty="0" smtClean="0"/>
-              <a:t>.</a:t>
-            </a:r>
-          </a:p>
-          <a:p>
+              <a:t>Если оригинал или экземпляры произведения, обнародованного в соответствии с настоящим параграфом, правомерно введены в гражданский оборот путем их продажи или иного отчуждения, дальнейшее распространение оригинала или экземпляров допускается без согласия публикатора и без выплаты ему вознаграждения.</a:t>
+            </a:r>
             <a:endParaRPr lang="ru-RU" dirty="0" smtClean="0"/>
           </a:p>
+        </p:txBody>
+      </p:sp>
+    </p:spTree>
+  </p:cSld>
+  <p:clrMapOvr>
+    <a:masterClrMapping/>
+  </p:clrMapOvr>
+</p:sld>
+</file>
+
+<file path=ppt/slides/slide6.xml><?xml version="1.0" encoding="utf-8"?>
+<p:sld xmlns:a="http://schemas.openxmlformats.org/drawingml/2006/main" xmlns:r="http://schemas.openxmlformats.org/officeDocument/2006/relationships" xmlns:p="http://schemas.openxmlformats.org/presentationml/2006/main">
+  <p:cSld>
+    <p:spTree>
+      <p:nvGrpSpPr>
+        <p:cNvPr id="1" name=""/>
+        <p:cNvGrpSpPr/>
+        <p:nvPr/>
+      </p:nvGrpSpPr>
+      <p:grpSpPr>
+        <a:xfrm>
+          <a:off x="0" y="0"/>
+          <a:ext cx="0" cy="0"/>
+          <a:chOff x="0" y="0"/>
+          <a:chExt cx="0" cy="0"/>
+        </a:xfrm>
+      </p:grpSpPr>
+      <p:sp>
+        <p:nvSpPr>
+          <p:cNvPr id="2" name="Заголовок 1"/>
+          <p:cNvSpPr>
+            <a:spLocks noGrp="1"/>
+          </p:cNvSpPr>
+          <p:nvPr>
+            <p:ph type="title"/>
+          </p:nvPr>
+        </p:nvSpPr>
+        <p:spPr/>
+        <p:txBody>
+          <a:bodyPr/>
+          <a:lstStyle/>
           <a:p>
             <a:r>
               <a:rPr lang="ru-RU" dirty="0" smtClean="0"/>
-              <a:t>3. Публикатор в течение срока действия исключительного права </a:t>
-            </a:r>
+              <a:t>Подглядим</a:t>
+            </a:r>
+            <a:endParaRPr lang="ru-RU" dirty="0"/>
+          </a:p>
+        </p:txBody>
+      </p:sp>
+      <p:sp>
+        <p:nvSpPr>
+          <p:cNvPr id="3" name="Содержимое 2"/>
+          <p:cNvSpPr>
+            <a:spLocks noGrp="1"/>
+          </p:cNvSpPr>
+          <p:nvPr>
+            <p:ph idx="1"/>
+          </p:nvPr>
+        </p:nvSpPr>
+        <p:spPr>
+          <a:xfrm>
+            <a:off x="1928794" y="2214554"/>
+            <a:ext cx="4614866" cy="822386"/>
+          </a:xfrm>
+        </p:spPr>
+        <p:txBody>
+          <a:bodyPr/>
+          <a:lstStyle/>
+          <a:p>
+            <a:pPr algn="ctr">
+              <a:buNone/>
+            </a:pPr>
             <a:r>
               <a:rPr lang="ru-RU" dirty="0" smtClean="0"/>
-              <a:t>публикатора </a:t>
+              <a:t>Директива </a:t>
             </a:r>
             <a:r>
               <a:rPr lang="ru-RU" dirty="0" smtClean="0"/>
-              <a:t>на произведение обладает правомочиями, указанными в абзаце втором пункта 1 статьи 1266 настоящего Кодекса. Такими же правомочиями обладает лицо, к которому перешло исключительное право публикатора на произведение</a:t>
-            </a:r>
+              <a:t>93/98/EEC</a:t>
+            </a:r>
+            <a:endParaRPr lang="ru-RU" dirty="0"/>
+          </a:p>
+        </p:txBody>
+      </p:sp>
+      <p:pic>
+        <p:nvPicPr>
+          <p:cNvPr id="18436" name="Picture 4" descr="ÐÐ°ÑÑÐ¸Ð½ÐºÐ¸ Ð¿Ð¾ Ð·Ð°Ð¿ÑÐ¾ÑÑ ÐµÐ²ÑÐ¾ÑÐ¾ÑÐ·"/>
+          <p:cNvPicPr>
+            <a:picLocks noChangeAspect="1" noChangeArrowheads="1"/>
+          </p:cNvPicPr>
+          <p:nvPr/>
+        </p:nvPicPr>
+        <p:blipFill>
+          <a:blip r:embed="rId2"/>
+          <a:srcRect/>
+          <a:stretch>
+            <a:fillRect/>
+          </a:stretch>
+        </p:blipFill>
+        <p:spPr bwMode="auto">
+          <a:xfrm>
+            <a:off x="1500166" y="2928934"/>
+            <a:ext cx="5643602" cy="3762401"/>
+          </a:xfrm>
+          <a:prstGeom prst="rect">
+            <a:avLst/>
+          </a:prstGeom>
+          <a:noFill/>
+        </p:spPr>
+      </p:pic>
+    </p:spTree>
+  </p:cSld>
+  <p:clrMapOvr>
+    <a:masterClrMapping/>
+  </p:clrMapOvr>
+</p:sld>
+</file>
+
+<file path=ppt/slides/slide7.xml><?xml version="1.0" encoding="utf-8"?>
+<p:sld xmlns:a="http://schemas.openxmlformats.org/drawingml/2006/main" xmlns:r="http://schemas.openxmlformats.org/officeDocument/2006/relationships" xmlns:p="http://schemas.openxmlformats.org/presentationml/2006/main">
+  <p:cSld>
+    <p:spTree>
+      <p:nvGrpSpPr>
+        <p:cNvPr id="1" name=""/>
+        <p:cNvGrpSpPr/>
+        <p:nvPr/>
+      </p:nvGrpSpPr>
+      <p:grpSpPr>
+        <a:xfrm>
+          <a:off x="0" y="0"/>
+          <a:ext cx="0" cy="0"/>
+          <a:chOff x="0" y="0"/>
+          <a:chExt cx="0" cy="0"/>
+        </a:xfrm>
+      </p:grpSpPr>
+      <p:sp>
+        <p:nvSpPr>
+          <p:cNvPr id="2" name="Заголовок 1"/>
+          <p:cNvSpPr>
+            <a:spLocks noGrp="1"/>
+          </p:cNvSpPr>
+          <p:nvPr>
+            <p:ph type="title"/>
+          </p:nvPr>
+        </p:nvSpPr>
+        <p:spPr>
+          <a:xfrm>
+            <a:off x="0" y="357166"/>
+            <a:ext cx="8229600" cy="1066800"/>
+          </a:xfrm>
+        </p:spPr>
+        <p:txBody>
+          <a:bodyPr/>
+          <a:lstStyle/>
+          <a:p>
             <a:r>
               <a:rPr lang="ru-RU" dirty="0" smtClean="0"/>
-              <a:t>.</a:t>
-            </a:r>
+              <a:t>Посмеёмся (или нет)</a:t>
+            </a:r>
+            <a:endParaRPr lang="ru-RU" dirty="0"/>
+          </a:p>
+        </p:txBody>
+      </p:sp>
+      <p:sp>
+        <p:nvSpPr>
+          <p:cNvPr id="3" name="Содержимое 2"/>
+          <p:cNvSpPr>
+            <a:spLocks noGrp="1"/>
+          </p:cNvSpPr>
+          <p:nvPr>
+            <p:ph idx="1"/>
+          </p:nvPr>
+        </p:nvSpPr>
+        <p:spPr>
+          <a:xfrm>
+            <a:off x="0" y="1428736"/>
+            <a:ext cx="9144000" cy="1500198"/>
+          </a:xfrm>
+        </p:spPr>
+        <p:txBody>
+          <a:bodyPr/>
+          <a:lstStyle/>
+          <a:p>
+            <a:r>
+              <a:rPr lang="ru-RU" dirty="0" smtClean="0"/>
+              <a:t>Дело №А55-26225/2009</a:t>
+            </a:r>
+            <a:r>
+              <a:rPr lang="en-US" dirty="0" smtClean="0"/>
+              <a:t> </a:t>
+            </a:r>
+            <a:r>
+              <a:rPr lang="ru-RU" dirty="0" smtClean="0"/>
+              <a:t>от </a:t>
+            </a:r>
+            <a:r>
+              <a:rPr lang="ru-RU" dirty="0" smtClean="0"/>
+              <a:t>28 апреля 2010 </a:t>
+            </a:r>
+            <a:r>
+              <a:rPr lang="ru-RU" dirty="0" smtClean="0"/>
+              <a:t>года, рассматриваемое Арбитражным судом Самарской области</a:t>
+            </a:r>
+          </a:p>
+          <a:p>
             <a:endParaRPr lang="ru-RU" dirty="0" smtClean="0"/>
+          </a:p>
+          <a:p>
+            <a:endParaRPr lang="ru-RU" dirty="0"/>
+          </a:p>
+        </p:txBody>
+      </p:sp>
+      <p:sp>
+        <p:nvSpPr>
+          <p:cNvPr id="4" name="TextBox 3"/>
+          <p:cNvSpPr txBox="1"/>
+          <p:nvPr/>
+        </p:nvSpPr>
+        <p:spPr>
+          <a:xfrm>
+            <a:off x="214282" y="3857628"/>
+            <a:ext cx="2286016" cy="523220"/>
+          </a:xfrm>
+          <a:prstGeom prst="rect">
+            <a:avLst/>
+          </a:prstGeom>
+          <a:noFill/>
+        </p:spPr>
+        <p:txBody>
+          <a:bodyPr wrap="square" rtlCol="0">
+            <a:spAutoFit/>
+          </a:bodyPr>
+          <a:lstStyle/>
+          <a:p>
+            <a:r>
+              <a:rPr lang="ru-RU" sz="2800" dirty="0" smtClean="0"/>
+              <a:t>ИП Воронов</a:t>
+            </a:r>
+            <a:endParaRPr lang="ru-RU" sz="2800" dirty="0"/>
+          </a:p>
+        </p:txBody>
+      </p:sp>
+      <p:sp>
+        <p:nvSpPr>
+          <p:cNvPr id="5" name="TextBox 4"/>
+          <p:cNvSpPr txBox="1"/>
+          <p:nvPr/>
+        </p:nvSpPr>
+        <p:spPr>
+          <a:xfrm>
+            <a:off x="5929322" y="3857628"/>
+            <a:ext cx="2786082" cy="523220"/>
+          </a:xfrm>
+          <a:prstGeom prst="rect">
+            <a:avLst/>
+          </a:prstGeom>
+          <a:noFill/>
+        </p:spPr>
+        <p:txBody>
+          <a:bodyPr wrap="square" rtlCol="0">
+            <a:spAutoFit/>
+          </a:bodyPr>
+          <a:lstStyle/>
+          <a:p>
+            <a:r>
+              <a:rPr lang="ru-RU" sz="2800" dirty="0" smtClean="0"/>
+              <a:t>ООО «Сафари»</a:t>
+            </a:r>
+            <a:endParaRPr lang="ru-RU" sz="2800" dirty="0"/>
+          </a:p>
+        </p:txBody>
+      </p:sp>
+      <p:sp>
+        <p:nvSpPr>
+          <p:cNvPr id="6" name="Развернутая стрелка 5"/>
+          <p:cNvSpPr/>
+          <p:nvPr/>
+        </p:nvSpPr>
+        <p:spPr>
+          <a:xfrm>
+            <a:off x="2000232" y="3357562"/>
+            <a:ext cx="5572164" cy="428628"/>
+          </a:xfrm>
+          <a:prstGeom prst="uturnArrow">
+            <a:avLst/>
+          </a:prstGeom>
+        </p:spPr>
+        <p:style>
+          <a:lnRef idx="2">
+            <a:schemeClr val="accent1">
+              <a:shade val="50000"/>
+            </a:schemeClr>
+          </a:lnRef>
+          <a:fillRef idx="1">
+            <a:schemeClr val="accent1"/>
+          </a:fillRef>
+          <a:effectRef idx="0">
+            <a:schemeClr val="accent1"/>
+          </a:effectRef>
+          <a:fontRef idx="minor">
+            <a:schemeClr val="lt1"/>
+          </a:fontRef>
+        </p:style>
+        <p:txBody>
+          <a:bodyPr rtlCol="0" anchor="ctr"/>
+          <a:lstStyle/>
+          <a:p>
+            <a:pPr algn="ctr"/>
+            <a:endParaRPr lang="ru-RU">
+              <a:solidFill>
+                <a:schemeClr val="tx1"/>
+              </a:solidFill>
+            </a:endParaRPr>
+          </a:p>
+        </p:txBody>
+      </p:sp>
+      <p:sp>
+        <p:nvSpPr>
+          <p:cNvPr id="7" name="Развернутая стрелка 6"/>
+          <p:cNvSpPr/>
+          <p:nvPr/>
+        </p:nvSpPr>
+        <p:spPr>
+          <a:xfrm rot="10800000">
+            <a:off x="2000232" y="4429132"/>
+            <a:ext cx="5572164" cy="428628"/>
+          </a:xfrm>
+          <a:prstGeom prst="uturnArrow">
+            <a:avLst/>
+          </a:prstGeom>
+        </p:spPr>
+        <p:style>
+          <a:lnRef idx="2">
+            <a:schemeClr val="accent1">
+              <a:shade val="50000"/>
+            </a:schemeClr>
+          </a:lnRef>
+          <a:fillRef idx="1">
+            <a:schemeClr val="accent1"/>
+          </a:fillRef>
+          <a:effectRef idx="0">
+            <a:schemeClr val="accent1"/>
+          </a:effectRef>
+          <a:fontRef idx="minor">
+            <a:schemeClr val="lt1"/>
+          </a:fontRef>
+        </p:style>
+        <p:txBody>
+          <a:bodyPr rtlCol="0" anchor="ctr"/>
+          <a:lstStyle/>
+          <a:p>
+            <a:pPr algn="ctr"/>
+            <a:endParaRPr lang="ru-RU">
+              <a:solidFill>
+                <a:schemeClr val="tx1"/>
+              </a:solidFill>
+            </a:endParaRPr>
+          </a:p>
+        </p:txBody>
+      </p:sp>
+      <p:sp>
+        <p:nvSpPr>
+          <p:cNvPr id="8" name="TextBox 7"/>
+          <p:cNvSpPr txBox="1"/>
+          <p:nvPr/>
+        </p:nvSpPr>
+        <p:spPr>
+          <a:xfrm>
+            <a:off x="1928794" y="2857496"/>
+            <a:ext cx="6715172" cy="369332"/>
+          </a:xfrm>
+          <a:prstGeom prst="rect">
+            <a:avLst/>
+          </a:prstGeom>
+          <a:noFill/>
+        </p:spPr>
+        <p:txBody>
+          <a:bodyPr wrap="square" rtlCol="0">
+            <a:spAutoFit/>
+          </a:bodyPr>
+          <a:lstStyle/>
+          <a:p>
+            <a:r>
+              <a:rPr lang="ru-RU" dirty="0" smtClean="0"/>
+              <a:t>иск </a:t>
+            </a:r>
+            <a:r>
+              <a:rPr lang="ru-RU" dirty="0" smtClean="0"/>
+              <a:t>о признании авторского договора незаключенным</a:t>
+            </a:r>
+            <a:endParaRPr lang="ru-RU" dirty="0"/>
+          </a:p>
+        </p:txBody>
+      </p:sp>
+      <p:sp>
+        <p:nvSpPr>
+          <p:cNvPr id="9" name="TextBox 8"/>
+          <p:cNvSpPr txBox="1"/>
+          <p:nvPr/>
+        </p:nvSpPr>
+        <p:spPr>
+          <a:xfrm>
+            <a:off x="2285984" y="5000636"/>
+            <a:ext cx="5072098" cy="646331"/>
+          </a:xfrm>
+          <a:prstGeom prst="rect">
+            <a:avLst/>
+          </a:prstGeom>
+          <a:noFill/>
+        </p:spPr>
+        <p:txBody>
+          <a:bodyPr wrap="square" rtlCol="0">
+            <a:spAutoFit/>
+          </a:bodyPr>
+          <a:lstStyle/>
+          <a:p>
+            <a:r>
+              <a:rPr lang="ru-RU" dirty="0" smtClean="0"/>
+              <a:t>в</a:t>
+            </a:r>
+            <a:r>
+              <a:rPr lang="ru-RU" dirty="0" smtClean="0"/>
+              <a:t>стречный иск </a:t>
+            </a:r>
+            <a:r>
+              <a:rPr lang="ru-RU" dirty="0" smtClean="0"/>
+              <a:t>о взыскании 100 000 </a:t>
+            </a:r>
+            <a:r>
+              <a:rPr lang="ru-RU" dirty="0" smtClean="0"/>
+              <a:t>руб. и </a:t>
+            </a:r>
+            <a:r>
+              <a:rPr lang="ru-RU" dirty="0" err="1" smtClean="0"/>
+              <a:t>обязании</a:t>
+            </a:r>
+            <a:r>
+              <a:rPr lang="ru-RU" dirty="0" smtClean="0"/>
+              <a:t> опубликовать решение суда</a:t>
+            </a:r>
+            <a:endParaRPr lang="ru-RU" dirty="0"/>
+          </a:p>
+        </p:txBody>
+      </p:sp>
+    </p:spTree>
+  </p:cSld>
+  <p:clrMapOvr>
+    <a:masterClrMapping/>
+  </p:clrMapOvr>
+</p:sld>
+</file>
+
+<file path=ppt/slides/slide8.xml><?xml version="1.0" encoding="utf-8"?>
+<p:sld xmlns:a="http://schemas.openxmlformats.org/drawingml/2006/main" xmlns:r="http://schemas.openxmlformats.org/officeDocument/2006/relationships" xmlns:p="http://schemas.openxmlformats.org/presentationml/2006/main">
+  <p:cSld>
+    <p:spTree>
+      <p:nvGrpSpPr>
+        <p:cNvPr id="1" name=""/>
+        <p:cNvGrpSpPr/>
+        <p:nvPr/>
+      </p:nvGrpSpPr>
+      <p:grpSpPr>
+        <a:xfrm>
+          <a:off x="0" y="0"/>
+          <a:ext cx="0" cy="0"/>
+          <a:chOff x="0" y="0"/>
+          <a:chExt cx="0" cy="0"/>
+        </a:xfrm>
+      </p:grpSpPr>
+      <p:sp>
+        <p:nvSpPr>
+          <p:cNvPr id="2" name="Заголовок 1"/>
+          <p:cNvSpPr>
+            <a:spLocks noGrp="1"/>
+          </p:cNvSpPr>
+          <p:nvPr>
+            <p:ph type="title"/>
+          </p:nvPr>
+        </p:nvSpPr>
+        <p:spPr/>
+        <p:txBody>
+          <a:bodyPr/>
+          <a:lstStyle/>
+          <a:p>
+            <a:r>
+              <a:rPr lang="ru-RU" dirty="0" smtClean="0"/>
+              <a:t>Взгрустнём</a:t>
+            </a:r>
+            <a:endParaRPr lang="ru-RU" dirty="0"/>
+          </a:p>
+        </p:txBody>
+      </p:sp>
+      <p:sp>
+        <p:nvSpPr>
+          <p:cNvPr id="3" name="Содержимое 2"/>
+          <p:cNvSpPr>
+            <a:spLocks noGrp="1"/>
+          </p:cNvSpPr>
+          <p:nvPr>
+            <p:ph idx="1"/>
+          </p:nvPr>
+        </p:nvSpPr>
+        <p:spPr>
+          <a:xfrm>
+            <a:off x="457200" y="2249424"/>
+            <a:ext cx="5543560" cy="4325112"/>
+          </a:xfrm>
+        </p:spPr>
+        <p:txBody>
+          <a:bodyPr>
+            <a:normAutofit fontScale="77500" lnSpcReduction="20000"/>
+          </a:bodyPr>
+          <a:lstStyle/>
+          <a:p>
+            <a:r>
+              <a:rPr lang="ru-RU" dirty="0" smtClean="0"/>
+              <a:t>Отсутствие механизма реализации правовых норм на практике</a:t>
+            </a:r>
+          </a:p>
+          <a:p>
+            <a:r>
+              <a:rPr lang="ru-RU" dirty="0" smtClean="0"/>
+              <a:t>Отсутствие </a:t>
+            </a:r>
+            <a:r>
+              <a:rPr lang="ru-RU" dirty="0" smtClean="0"/>
+              <a:t>специального органа исполнительной власти, </a:t>
+            </a:r>
+            <a:r>
+              <a:rPr lang="ru-RU" dirty="0" smtClean="0"/>
+              <a:t>осуществляющего управление </a:t>
+            </a:r>
+            <a:r>
+              <a:rPr lang="ru-RU" dirty="0" smtClean="0"/>
+              <a:t>в сфере реализации прав публикатора</a:t>
+            </a:r>
+          </a:p>
+          <a:p>
+            <a:r>
+              <a:rPr lang="ru-RU" dirty="0" smtClean="0"/>
+              <a:t>Отсутствие </a:t>
+            </a:r>
+            <a:r>
+              <a:rPr lang="ru-RU" dirty="0" smtClean="0"/>
+              <a:t>в свободном доступе базы данных по обнародованным произведениям</a:t>
+            </a:r>
+          </a:p>
+          <a:p>
+            <a:r>
+              <a:rPr lang="ru-RU" dirty="0" smtClean="0"/>
+              <a:t>Отсутствие </a:t>
+            </a:r>
+            <a:r>
+              <a:rPr lang="ru-RU" dirty="0" smtClean="0"/>
+              <a:t>алгоритма решения межличностных и деловых </a:t>
+            </a:r>
+            <a:r>
+              <a:rPr lang="ru-RU" dirty="0" smtClean="0"/>
+              <a:t>вопросов, связанных с выяснением личности публикатора в споре</a:t>
+            </a:r>
+            <a:endParaRPr lang="ru-RU" dirty="0" smtClean="0"/>
+          </a:p>
+          <a:p>
+            <a:r>
+              <a:rPr lang="ru-RU" dirty="0" smtClean="0"/>
+              <a:t>Скудность </a:t>
+            </a:r>
+            <a:r>
+              <a:rPr lang="ru-RU" dirty="0" smtClean="0"/>
+              <a:t>правоприменительной практики по правам публикатора</a:t>
+            </a:r>
+            <a:endParaRPr lang="ru-RU" dirty="0"/>
+          </a:p>
+        </p:txBody>
+      </p:sp>
+      <p:pic>
+        <p:nvPicPr>
+          <p:cNvPr id="2050" name="Picture 2" descr="ÐÐ°ÑÑÐ¸Ð½ÐºÐ¸ Ð¿Ð¾ Ð·Ð°Ð¿ÑÐ¾ÑÑ ÑÐµÐ³Ð¾ Ð½Ðµ Ñ+Ð²Ð°ÑÐ°ÐµÑ"/>
+          <p:cNvPicPr>
+            <a:picLocks noChangeAspect="1" noChangeArrowheads="1"/>
+          </p:cNvPicPr>
+          <p:nvPr/>
+        </p:nvPicPr>
+        <p:blipFill>
+          <a:blip r:embed="rId2"/>
+          <a:srcRect/>
+          <a:stretch>
+            <a:fillRect/>
+          </a:stretch>
+        </p:blipFill>
+        <p:spPr bwMode="auto">
+          <a:xfrm>
+            <a:off x="6357950" y="2571744"/>
+            <a:ext cx="2438400" cy="2438400"/>
+          </a:xfrm>
+          <a:prstGeom prst="rect">
+            <a:avLst/>
+          </a:prstGeom>
+          <a:noFill/>
+        </p:spPr>
+      </p:pic>
+    </p:spTree>
+  </p:cSld>
+  <p:clrMapOvr>
+    <a:masterClrMapping/>
+  </p:clrMapOvr>
+</p:sld>
+</file>
+
+<file path=ppt/slides/slide9.xml><?xml version="1.0" encoding="utf-8"?>
+<p:sld xmlns:a="http://schemas.openxmlformats.org/drawingml/2006/main" xmlns:r="http://schemas.openxmlformats.org/officeDocument/2006/relationships" xmlns:p="http://schemas.openxmlformats.org/presentationml/2006/main">
+  <p:cSld>
+    <p:spTree>
+      <p:nvGrpSpPr>
+        <p:cNvPr id="1" name=""/>
+        <p:cNvGrpSpPr/>
+        <p:nvPr/>
+      </p:nvGrpSpPr>
+      <p:grpSpPr>
+        <a:xfrm>
+          <a:off x="0" y="0"/>
+          <a:ext cx="0" cy="0"/>
+          <a:chOff x="0" y="0"/>
+          <a:chExt cx="0" cy="0"/>
+        </a:xfrm>
+      </p:grpSpPr>
+      <p:sp>
+        <p:nvSpPr>
+          <p:cNvPr id="2" name="Заголовок 1"/>
+          <p:cNvSpPr>
+            <a:spLocks noGrp="1"/>
+          </p:cNvSpPr>
+          <p:nvPr>
+            <p:ph type="title"/>
+          </p:nvPr>
+        </p:nvSpPr>
+        <p:spPr/>
+        <p:txBody>
+          <a:bodyPr/>
+          <a:lstStyle/>
+          <a:p>
+            <a:r>
+              <a:rPr lang="ru-RU" dirty="0" smtClean="0"/>
+              <a:t>Источники</a:t>
+            </a:r>
+            <a:endParaRPr lang="ru-RU" dirty="0"/>
+          </a:p>
+        </p:txBody>
+      </p:sp>
+      <p:sp>
+        <p:nvSpPr>
+          <p:cNvPr id="3" name="Содержимое 2"/>
+          <p:cNvSpPr>
+            <a:spLocks noGrp="1"/>
+          </p:cNvSpPr>
+          <p:nvPr>
+            <p:ph idx="1"/>
+          </p:nvPr>
+        </p:nvSpPr>
+        <p:spPr/>
+        <p:txBody>
+          <a:bodyPr>
+            <a:normAutofit/>
+          </a:bodyPr>
+          <a:lstStyle/>
+          <a:p>
+            <a:r>
+              <a:rPr lang="ru-RU" sz="1800" dirty="0" smtClean="0"/>
+              <a:t>ГК РФ</a:t>
+            </a:r>
+          </a:p>
+          <a:p>
+            <a:r>
+              <a:rPr lang="ru-RU" sz="1800" dirty="0" err="1" smtClean="0"/>
+              <a:t>Засимов</a:t>
+            </a:r>
+            <a:r>
+              <a:rPr lang="ru-RU" sz="1800" dirty="0" smtClean="0"/>
+              <a:t> </a:t>
+            </a:r>
+            <a:r>
+              <a:rPr lang="ru-RU" sz="1800" dirty="0" smtClean="0"/>
+              <a:t>Дмитрий </a:t>
+            </a:r>
+            <a:r>
+              <a:rPr lang="ru-RU" sz="1800" dirty="0" smtClean="0"/>
+              <a:t>Михайлович - «</a:t>
+            </a:r>
+            <a:r>
+              <a:rPr lang="ru-RU" sz="1800" dirty="0" smtClean="0"/>
+              <a:t>ПРАВА ПУБЛИКАТОРА В РОССИЙСКОЙ ФЕДЕРАЦИИ: ПОНЯТИЕ, ПРОБЛЕМЫ РЕАЛИЗАЦИИ, ПРАКТИЧЕСКОЕ </a:t>
+            </a:r>
+            <a:r>
+              <a:rPr lang="ru-RU" sz="1800" dirty="0" smtClean="0"/>
+              <a:t>ЗНАЧЕНИЕ» // статья; </a:t>
+            </a:r>
+            <a:r>
+              <a:rPr lang="ru-RU" sz="1800" dirty="0" smtClean="0"/>
+              <a:t>журнал Грамота, 2012. № 11 (25)</a:t>
+            </a:r>
+            <a:endParaRPr lang="ru-RU" sz="1800" dirty="0"/>
           </a:p>
         </p:txBody>
       </p:sp>

</xml_diff>